<commit_message>
powerpoint actualizados clase 5 a 8
</commit_message>
<xml_diff>
--- a/clase_7/teoria/Clase_7.pptx
+++ b/clase_7/teoria/Clase_7.pptx
@@ -290,7 +290,7 @@
       </p15:sldGuideLst>
     </p:ext>
     <p:ext uri="GoogleSlidesCustomDataVersion2">
-      <go:slidesCustomData xmlns:go="http://customooxmlschemas.google.com/" xmlns:ahyp="http://schemas.microsoft.com/office/drawing/2018/hyperlinkcolor" xmlns:p15="http://schemas.microsoft.com/office/powerpoint/2012/main" xmlns:p14="http://schemas.microsoft.com/office/powerpoint/2010/main" xmlns:com="http://schemas.openxmlformats.org/drawingml/2006/compatibility" xmlns:pvml="urn:schemas-microsoft-com:office:powerpoint" xmlns:v="urn:schemas-microsoft-com:vml" xmlns:o="urn:schemas-microsoft-com:office:office" xmlns:dgm="http://schemas.openxmlformats.org/drawingml/2006/diagram" xmlns:c="http://schemas.openxmlformats.org/drawingml/2006/chart" xmlns:mv="urn:schemas-microsoft-com:mac:vml" xmlns:mc="http://schemas.openxmlformats.org/markup-compatibility/2006" xmlns="" r:id="rId35" roundtripDataSignature="AMtx7mjFLyGGbKtZ6MKWK8o6r1g77If8Vw=="/>
+      <go:slidesCustomData xmlns="" xmlns:mc="http://schemas.openxmlformats.org/markup-compatibility/2006" xmlns:mv="urn:schemas-microsoft-com:mac:vml" xmlns:c="http://schemas.openxmlformats.org/drawingml/2006/chart" xmlns:dgm="http://schemas.openxmlformats.org/drawingml/2006/diagram" xmlns:o="urn:schemas-microsoft-com:office:office" xmlns:v="urn:schemas-microsoft-com:vml" xmlns:pvml="urn:schemas-microsoft-com:office:powerpoint" xmlns:com="http://schemas.openxmlformats.org/drawingml/2006/compatibility" xmlns:p14="http://schemas.microsoft.com/office/powerpoint/2010/main" xmlns:p15="http://schemas.microsoft.com/office/powerpoint/2012/main" xmlns:ahyp="http://schemas.microsoft.com/office/drawing/2018/hyperlinkcolor" xmlns:go="http://customooxmlschemas.google.com/" r:id="rId35" roundtripDataSignature="AMtx7mjFLyGGbKtZ6MKWK8o6r1g77If8Vw=="/>
     </p:ext>
   </p:extLst>
 </p:presentation>
@@ -530,6 +530,68 @@
             <pc:docMk/>
             <pc:sldMk cId="0" sldId="280"/>
             <ac:spMk id="295" creationId="{00000000-0000-0000-0000-000000000000}"/>
+          </ac:spMkLst>
+        </pc:spChg>
+      </pc:sldChg>
+    </pc:docChg>
+  </pc:docChgLst>
+  <pc:docChgLst>
+    <pc:chgData name="Marcos Maillot" userId="fa14b39d-e966-4ebb-a436-4f96f84b9577" providerId="ADAL" clId="{105229BA-9AA1-47D4-847D-E03C0431CECE}"/>
+    <pc:docChg chg="custSel modSld">
+      <pc:chgData name="Marcos Maillot" userId="fa14b39d-e966-4ebb-a436-4f96f84b9577" providerId="ADAL" clId="{105229BA-9AA1-47D4-847D-E03C0431CECE}" dt="2024-10-04T17:13:09.539" v="106" actId="20577"/>
+      <pc:docMkLst>
+        <pc:docMk/>
+      </pc:docMkLst>
+      <pc:sldChg chg="modSp mod">
+        <pc:chgData name="Marcos Maillot" userId="fa14b39d-e966-4ebb-a436-4f96f84b9577" providerId="ADAL" clId="{105229BA-9AA1-47D4-847D-E03C0431CECE}" dt="2024-10-04T17:13:09.539" v="106" actId="20577"/>
+        <pc:sldMkLst>
+          <pc:docMk/>
+          <pc:sldMk cId="0" sldId="257"/>
+        </pc:sldMkLst>
+        <pc:spChg chg="mod">
+          <ac:chgData name="Marcos Maillot" userId="fa14b39d-e966-4ebb-a436-4f96f84b9577" providerId="ADAL" clId="{105229BA-9AA1-47D4-847D-E03C0431CECE}" dt="2024-10-04T17:12:44.952" v="98" actId="20577"/>
+          <ac:spMkLst>
+            <pc:docMk/>
+            <pc:sldMk cId="0" sldId="257"/>
+            <ac:spMk id="82" creationId="{00000000-0000-0000-0000-000000000000}"/>
+          </ac:spMkLst>
+        </pc:spChg>
+        <pc:spChg chg="mod">
+          <ac:chgData name="Marcos Maillot" userId="fa14b39d-e966-4ebb-a436-4f96f84b9577" providerId="ADAL" clId="{105229BA-9AA1-47D4-847D-E03C0431CECE}" dt="2024-10-04T17:13:09.539" v="106" actId="20577"/>
+          <ac:spMkLst>
+            <pc:docMk/>
+            <pc:sldMk cId="0" sldId="257"/>
+            <ac:spMk id="84" creationId="{00000000-0000-0000-0000-000000000000}"/>
+          </ac:spMkLst>
+        </pc:spChg>
+      </pc:sldChg>
+      <pc:sldChg chg="modSp mod">
+        <pc:chgData name="Marcos Maillot" userId="fa14b39d-e966-4ebb-a436-4f96f84b9577" providerId="ADAL" clId="{105229BA-9AA1-47D4-847D-E03C0431CECE}" dt="2024-10-04T17:11:34.288" v="40" actId="5793"/>
+        <pc:sldMkLst>
+          <pc:docMk/>
+          <pc:sldMk cId="0" sldId="260"/>
+        </pc:sldMkLst>
+        <pc:spChg chg="mod">
+          <ac:chgData name="Marcos Maillot" userId="fa14b39d-e966-4ebb-a436-4f96f84b9577" providerId="ADAL" clId="{105229BA-9AA1-47D4-847D-E03C0431CECE}" dt="2024-10-04T17:11:34.288" v="40" actId="5793"/>
+          <ac:spMkLst>
+            <pc:docMk/>
+            <pc:sldMk cId="0" sldId="260"/>
+            <ac:spMk id="113" creationId="{00000000-0000-0000-0000-000000000000}"/>
+          </ac:spMkLst>
+        </pc:spChg>
+      </pc:sldChg>
+      <pc:sldChg chg="modSp mod">
+        <pc:chgData name="Marcos Maillot" userId="fa14b39d-e966-4ebb-a436-4f96f84b9577" providerId="ADAL" clId="{105229BA-9AA1-47D4-847D-E03C0431CECE}" dt="2024-10-04T17:12:03.614" v="63" actId="5793"/>
+        <pc:sldMkLst>
+          <pc:docMk/>
+          <pc:sldMk cId="0" sldId="262"/>
+        </pc:sldMkLst>
+        <pc:spChg chg="mod">
+          <ac:chgData name="Marcos Maillot" userId="fa14b39d-e966-4ebb-a436-4f96f84b9577" providerId="ADAL" clId="{105229BA-9AA1-47D4-847D-E03C0431CECE}" dt="2024-10-04T17:12:03.614" v="63" actId="5793"/>
+          <ac:spMkLst>
+            <pc:docMk/>
+            <pc:sldMk cId="0" sldId="262"/>
+            <ac:spMk id="137" creationId="{00000000-0000-0000-0000-000000000000}"/>
           </ac:spMkLst>
         </pc:spChg>
       </pc:sldChg>
@@ -2308,7 +2370,7 @@
         </p:nvSpPr>
         <p:spPr>
           <a:xfrm>
-            <a:off x="381300" y="685800"/>
+            <a:off x="381000" y="685800"/>
             <a:ext cx="6096000" cy="3429000"/>
           </a:xfrm>
           <a:custGeom>
@@ -3508,8 +3570,8 @@
         </p:nvSpPr>
         <p:spPr>
           <a:xfrm>
-            <a:off x="1143225" y="685800"/>
-            <a:ext cx="4572225" cy="3429000"/>
+            <a:off x="381000" y="685800"/>
+            <a:ext cx="6096000" cy="3429000"/>
           </a:xfrm>
           <a:custGeom>
             <a:avLst/>
@@ -18463,7 +18525,7 @@
         <p:spPr>
           <a:xfrm>
             <a:off x="471900" y="1986025"/>
-            <a:ext cx="3358800" cy="3050400"/>
+            <a:ext cx="3598950" cy="3050400"/>
           </a:xfrm>
           <a:prstGeom prst="rect">
             <a:avLst/>
@@ -18493,14 +18555,29 @@
               <a:buNone/>
             </a:pPr>
             <a:r>
-              <a:rPr lang="en">
+              <a:rPr lang="en" dirty="0">
                 <a:solidFill>
                   <a:schemeClr val="dk2"/>
                 </a:solidFill>
               </a:rPr>
               <a:t>. Autoencoders</a:t>
             </a:r>
-            <a:endParaRPr>
+          </a:p>
+          <a:p>
+            <a:pPr marL="0" lvl="0" indent="0" algn="l" rtl="0">
+              <a:lnSpc>
+                <a:spcPct val="95000"/>
+              </a:lnSpc>
+              <a:spcBef>
+                <a:spcPts val="0"/>
+              </a:spcBef>
+              <a:spcAft>
+                <a:spcPts val="0"/>
+              </a:spcAft>
+              <a:buSzPts val="1018"/>
+              <a:buNone/>
+            </a:pPr>
+            <a:endParaRPr lang="en" dirty="0">
               <a:solidFill>
                 <a:schemeClr val="dk2"/>
               </a:solidFill>
@@ -18512,6 +18589,171 @@
                 <a:spcPct val="95000"/>
               </a:lnSpc>
               <a:spcBef>
+                <a:spcPts val="0"/>
+              </a:spcBef>
+              <a:spcAft>
+                <a:spcPts val="0"/>
+              </a:spcAft>
+              <a:buSzPts val="1018"/>
+              <a:buNone/>
+            </a:pPr>
+            <a:r>
+              <a:rPr lang="es-AR" dirty="0">
+                <a:solidFill>
+                  <a:schemeClr val="dk2"/>
+                </a:solidFill>
+              </a:rPr>
+              <a:t>U</a:t>
+            </a:r>
+            <a:r>
+              <a:rPr lang="en" dirty="0">
+                <a:solidFill>
+                  <a:schemeClr val="dk2"/>
+                </a:solidFill>
+              </a:rPr>
+              <a:t>ndercomplete vs regularized AE</a:t>
+            </a:r>
+          </a:p>
+          <a:p>
+            <a:pPr marL="0" lvl="0" indent="0" algn="l" rtl="0">
+              <a:lnSpc>
+                <a:spcPct val="95000"/>
+              </a:lnSpc>
+              <a:spcBef>
+                <a:spcPts val="0"/>
+              </a:spcBef>
+              <a:spcAft>
+                <a:spcPts val="0"/>
+              </a:spcAft>
+              <a:buSzPts val="1018"/>
+              <a:buNone/>
+            </a:pPr>
+            <a:endParaRPr lang="en" dirty="0">
+              <a:solidFill>
+                <a:schemeClr val="dk2"/>
+              </a:solidFill>
+            </a:endParaRPr>
+          </a:p>
+          <a:p>
+            <a:pPr marL="0" lvl="0" indent="0" algn="l" rtl="0">
+              <a:lnSpc>
+                <a:spcPct val="95000"/>
+              </a:lnSpc>
+              <a:spcBef>
+                <a:spcPts val="0"/>
+              </a:spcBef>
+              <a:spcAft>
+                <a:spcPts val="0"/>
+              </a:spcAft>
+              <a:buSzPts val="1018"/>
+              <a:buNone/>
+            </a:pPr>
+            <a:r>
+              <a:rPr lang="en" dirty="0">
+                <a:solidFill>
+                  <a:schemeClr val="dk2"/>
+                </a:solidFill>
+              </a:rPr>
+              <a:t>Manifold learning</a:t>
+            </a:r>
+          </a:p>
+          <a:p>
+            <a:pPr marL="0" lvl="0" indent="0" algn="l" rtl="0">
+              <a:lnSpc>
+                <a:spcPct val="95000"/>
+              </a:lnSpc>
+              <a:spcBef>
+                <a:spcPts val="0"/>
+              </a:spcBef>
+              <a:spcAft>
+                <a:spcPts val="0"/>
+              </a:spcAft>
+              <a:buSzPts val="1018"/>
+              <a:buNone/>
+            </a:pPr>
+            <a:endParaRPr lang="en" dirty="0">
+              <a:solidFill>
+                <a:schemeClr val="dk2"/>
+              </a:solidFill>
+            </a:endParaRPr>
+          </a:p>
+          <a:p>
+            <a:pPr marL="0" lvl="0" indent="0" algn="l" rtl="0">
+              <a:lnSpc>
+                <a:spcPct val="95000"/>
+              </a:lnSpc>
+              <a:spcBef>
+                <a:spcPts val="0"/>
+              </a:spcBef>
+              <a:spcAft>
+                <a:spcPts val="0"/>
+              </a:spcAft>
+              <a:buSzPts val="1018"/>
+              <a:buNone/>
+            </a:pPr>
+            <a:r>
+              <a:rPr lang="en" dirty="0">
+                <a:solidFill>
+                  <a:schemeClr val="dk2"/>
+                </a:solidFill>
+              </a:rPr>
+              <a:t>Varational AE</a:t>
+            </a:r>
+          </a:p>
+          <a:p>
+            <a:pPr marL="0" lvl="0" indent="0" algn="l" rtl="0">
+              <a:lnSpc>
+                <a:spcPct val="95000"/>
+              </a:lnSpc>
+              <a:spcBef>
+                <a:spcPts val="0"/>
+              </a:spcBef>
+              <a:spcAft>
+                <a:spcPts val="0"/>
+              </a:spcAft>
+              <a:buSzPts val="1018"/>
+              <a:buNone/>
+            </a:pPr>
+            <a:endParaRPr lang="en" dirty="0">
+              <a:solidFill>
+                <a:schemeClr val="dk2"/>
+              </a:solidFill>
+            </a:endParaRPr>
+          </a:p>
+          <a:p>
+            <a:pPr marL="0" lvl="0" indent="0" algn="l" rtl="0">
+              <a:lnSpc>
+                <a:spcPct val="95000"/>
+              </a:lnSpc>
+              <a:spcBef>
+                <a:spcPts val="0"/>
+              </a:spcBef>
+              <a:spcAft>
+                <a:spcPts val="0"/>
+              </a:spcAft>
+              <a:buSzPts val="1018"/>
+              <a:buNone/>
+            </a:pPr>
+            <a:r>
+              <a:rPr lang="en" dirty="0">
+                <a:solidFill>
+                  <a:schemeClr val="dk2"/>
+                </a:solidFill>
+              </a:rPr>
+              <a:t>Denoising AE</a:t>
+            </a:r>
+            <a:endParaRPr dirty="0">
+              <a:solidFill>
+                <a:schemeClr val="dk2"/>
+              </a:solidFill>
+            </a:endParaRPr>
+          </a:p>
+          <a:p>
+            <a:pPr marL="0" lvl="0" indent="0" algn="l" rtl="0">
+              <a:lnSpc>
+                <a:spcPct val="95000"/>
+              </a:lnSpc>
+              <a:spcBef>
                 <a:spcPts val="1200"/>
               </a:spcBef>
               <a:spcAft>
@@ -18520,7 +18762,7 @@
               <a:buSzPts val="1018"/>
               <a:buNone/>
             </a:pPr>
-            <a:endParaRPr>
+            <a:endParaRPr dirty="0">
               <a:solidFill>
                 <a:schemeClr val="dk2"/>
               </a:solidFill>
@@ -18598,14 +18840,29 @@
               <a:buNone/>
             </a:pPr>
             <a:r>
-              <a:rPr lang="en">
+              <a:rPr lang="en" dirty="0">
                 <a:solidFill>
                   <a:schemeClr val="dk2"/>
                 </a:solidFill>
               </a:rPr>
-              <a:t>. Representation learning / embeddings</a:t>
+              <a:t>. Representation learning </a:t>
             </a:r>
-            <a:endParaRPr>
+          </a:p>
+          <a:p>
+            <a:pPr marL="0" lvl="0" indent="0" algn="l" rtl="0">
+              <a:lnSpc>
+                <a:spcPct val="115000"/>
+              </a:lnSpc>
+              <a:spcBef>
+                <a:spcPts val="0"/>
+              </a:spcBef>
+              <a:spcAft>
+                <a:spcPts val="0"/>
+              </a:spcAft>
+              <a:buSzPts val="1800"/>
+              <a:buNone/>
+            </a:pPr>
+            <a:endParaRPr lang="en" dirty="0">
               <a:solidFill>
                 <a:schemeClr val="dk2"/>
               </a:solidFill>
@@ -18617,6 +18874,34 @@
                 <a:spcPct val="115000"/>
               </a:lnSpc>
               <a:spcBef>
+                <a:spcPts val="0"/>
+              </a:spcBef>
+              <a:spcAft>
+                <a:spcPts val="0"/>
+              </a:spcAft>
+              <a:buSzPts val="1800"/>
+              <a:buNone/>
+            </a:pPr>
+            <a:r>
+              <a:rPr lang="en" dirty="0">
+                <a:solidFill>
+                  <a:schemeClr val="dk2"/>
+                </a:solidFill>
+              </a:rPr>
+              <a:t>. Embeddings</a:t>
+            </a:r>
+            <a:endParaRPr dirty="0">
+              <a:solidFill>
+                <a:schemeClr val="dk2"/>
+              </a:solidFill>
+            </a:endParaRPr>
+          </a:p>
+          <a:p>
+            <a:pPr marL="0" lvl="0" indent="0" algn="l" rtl="0">
+              <a:lnSpc>
+                <a:spcPct val="115000"/>
+              </a:lnSpc>
+              <a:spcBef>
                 <a:spcPts val="1200"/>
               </a:spcBef>
               <a:spcAft>
@@ -18625,7 +18910,7 @@
               <a:buSzPts val="1800"/>
               <a:buNone/>
             </a:pPr>
-            <a:endParaRPr>
+            <a:endParaRPr dirty="0">
               <a:solidFill>
                 <a:schemeClr val="dk2"/>
               </a:solidFill>
@@ -21366,7 +21651,7 @@
               <a:buNone/>
             </a:pPr>
             <a:r>
-              <a:rPr lang="en" sz="2100">
+              <a:rPr lang="en" sz="2100" dirty="0">
                 <a:solidFill>
                   <a:schemeClr val="dk2"/>
                 </a:solidFill>
@@ -21375,9 +21660,33 @@
                 <a:cs typeface="Twentieth Century"/>
                 <a:sym typeface="Twentieth Century"/>
               </a:rPr>
-              <a:t>Sparse autoencodes 🡪 limitación de activación neuronas</a:t>
+              <a:t>Sparse autoencodes </a:t>
             </a:r>
-            <a:endParaRPr sz="2100">
+            <a:r>
+              <a:rPr lang="en" sz="2100" dirty="0">
+                <a:solidFill>
+                  <a:schemeClr val="dk2"/>
+                </a:solidFill>
+                <a:latin typeface="Twentieth Century"/>
+                <a:ea typeface="Twentieth Century"/>
+                <a:cs typeface="Twentieth Century"/>
+                <a:sym typeface="Wingdings" panose="05000000000000000000" pitchFamily="2" charset="2"/>
+              </a:rPr>
+              <a:t></a:t>
+            </a:r>
+            <a:r>
+              <a:rPr lang="en" sz="2100" dirty="0">
+                <a:solidFill>
+                  <a:schemeClr val="dk2"/>
+                </a:solidFill>
+                <a:latin typeface="Twentieth Century"/>
+                <a:ea typeface="Twentieth Century"/>
+                <a:cs typeface="Twentieth Century"/>
+                <a:sym typeface="Twentieth Century"/>
+              </a:rPr>
+              <a:t> limitación de activación neuronas</a:t>
+            </a:r>
+            <a:endParaRPr sz="2100" dirty="0">
               <a:solidFill>
                 <a:schemeClr val="dk2"/>
               </a:solidFill>
@@ -22962,7 +23271,7 @@
               <a:buChar char="•"/>
             </a:pPr>
             <a:r>
-              <a:rPr lang="en" sz="1800" b="1" i="0" u="none" strike="noStrike" cap="none">
+              <a:rPr lang="en" sz="1800" b="1" i="0" u="none" strike="noStrike" cap="none" dirty="0">
                 <a:solidFill>
                   <a:schemeClr val="dk2"/>
                 </a:solidFill>
@@ -22971,10 +23280,34 @@
                 <a:cs typeface="Twentieth Century"/>
                 <a:sym typeface="Twentieth Century"/>
               </a:rPr>
-              <a:t>Manifold 🡪 </a:t>
+              <a:t>Manifold </a:t>
             </a:r>
             <a:r>
-              <a:rPr lang="en" sz="1800" b="0" i="0" u="none" strike="noStrike" cap="none">
+              <a:rPr lang="en" sz="1800" b="1" i="0" u="none" strike="noStrike" cap="none" dirty="0">
+                <a:solidFill>
+                  <a:schemeClr val="dk2"/>
+                </a:solidFill>
+                <a:latin typeface="Twentieth Century"/>
+                <a:ea typeface="Twentieth Century"/>
+                <a:cs typeface="Twentieth Century"/>
+                <a:sym typeface="Wingdings" panose="05000000000000000000" pitchFamily="2" charset="2"/>
+              </a:rPr>
+              <a:t></a:t>
+            </a:r>
+            <a:r>
+              <a:rPr lang="en" sz="1800" b="1" i="0" u="none" strike="noStrike" cap="none" dirty="0">
+                <a:solidFill>
+                  <a:schemeClr val="dk2"/>
+                </a:solidFill>
+                <a:latin typeface="Twentieth Century"/>
+                <a:ea typeface="Twentieth Century"/>
+                <a:cs typeface="Twentieth Century"/>
+                <a:sym typeface="Twentieth Century"/>
+              </a:rPr>
+              <a:t> </a:t>
+            </a:r>
+            <a:r>
+              <a:rPr lang="en" sz="1800" b="0" i="0" u="none" strike="noStrike" cap="none" dirty="0">
                 <a:solidFill>
                   <a:schemeClr val="dk2"/>
                 </a:solidFill>
@@ -22985,7 +23318,7 @@
               </a:rPr>
               <a:t>es un espacio N-dimensional, de menor dimensión del espacio original donde los datos se concentran.</a:t>
             </a:r>
-            <a:endParaRPr sz="1100">
+            <a:endParaRPr sz="1100" dirty="0">
               <a:solidFill>
                 <a:schemeClr val="dk2"/>
               </a:solidFill>
@@ -23006,7 +23339,7 @@
               <a:buFont typeface="Arial"/>
               <a:buNone/>
             </a:pPr>
-            <a:endParaRPr sz="1800" b="0" i="0" u="none" strike="noStrike" cap="none">
+            <a:endParaRPr sz="1800" b="0" i="0" u="none" strike="noStrike" cap="none" dirty="0">
               <a:solidFill>
                 <a:schemeClr val="dk2"/>
               </a:solidFill>
@@ -23032,7 +23365,7 @@
               <a:buChar char="•"/>
             </a:pPr>
             <a:r>
-              <a:rPr lang="en" sz="1800" b="0" i="0" u="none" strike="noStrike" cap="none">
+              <a:rPr lang="en" sz="1800" b="0" i="0" u="none" strike="noStrike" cap="none" dirty="0">
                 <a:solidFill>
                   <a:schemeClr val="dk2"/>
                 </a:solidFill>
@@ -23043,7 +23376,7 @@
               </a:rPr>
               <a:t>Si nos desplazamos dentro del manifold del MNIST, siempre encontraremos un número MNIST.</a:t>
             </a:r>
-            <a:endParaRPr sz="1100">
+            <a:endParaRPr sz="1100" dirty="0">
               <a:solidFill>
                 <a:schemeClr val="dk2"/>
               </a:solidFill>
@@ -23064,7 +23397,7 @@
               <a:buFont typeface="Arial"/>
               <a:buNone/>
             </a:pPr>
-            <a:endParaRPr sz="1800" b="0" i="0" u="none" strike="noStrike" cap="none">
+            <a:endParaRPr sz="1800" b="0" i="0" u="none" strike="noStrike" cap="none" dirty="0">
               <a:solidFill>
                 <a:schemeClr val="dk2"/>
               </a:solidFill>
@@ -23090,7 +23423,7 @@
               <a:buChar char="•"/>
             </a:pPr>
             <a:r>
-              <a:rPr lang="en" sz="1800" b="0" i="0" u="none" strike="noStrike" cap="none">
+              <a:rPr lang="en" sz="1800" b="0" i="0" u="none" strike="noStrike" cap="none" dirty="0">
                 <a:solidFill>
                   <a:schemeClr val="dk2"/>
                 </a:solidFill>
@@ -23102,7 +23435,7 @@
               <a:t>Si nos salimos de dicho </a:t>
             </a:r>
             <a:r>
-              <a:rPr lang="en" sz="1800" b="1" i="0" u="none" strike="noStrike" cap="none">
+              <a:rPr lang="en" sz="1800" b="1" i="0" u="none" strike="noStrike" cap="none" dirty="0">
                 <a:solidFill>
                   <a:schemeClr val="dk2"/>
                 </a:solidFill>
@@ -23114,7 +23447,7 @@
               <a:t>manifold</a:t>
             </a:r>
             <a:r>
-              <a:rPr lang="en" sz="1800" b="0" i="0" u="none" strike="noStrike" cap="none">
+              <a:rPr lang="en" sz="1800" b="0" i="0" u="none" strike="noStrike" cap="none" dirty="0">
                 <a:solidFill>
                   <a:schemeClr val="dk2"/>
                 </a:solidFill>
@@ -23125,7 +23458,7 @@
               </a:rPr>
               <a:t>, no encontraremos un número MNIST.</a:t>
             </a:r>
-            <a:endParaRPr sz="1100">
+            <a:endParaRPr sz="1100" dirty="0">
               <a:solidFill>
                 <a:schemeClr val="dk2"/>
               </a:solidFill>

</xml_diff>